<commit_message>
Update gửi mail thông báo hóa đơn
</commit_message>
<xml_diff>
--- a/database/TranTuanNgoc_DoAn.pptx
+++ b/database/TranTuanNgoc_DoAn.pptx
@@ -2309,7 +2309,29 @@
               <a:ea typeface="Tahoma" panose="020B0604030504040204" pitchFamily="34" charset="0"/>
               <a:cs typeface="Tahoma" panose="020B0604030504040204" pitchFamily="34" charset="0"/>
             </a:rPr>
-            <a:t> hang.</a:t>
+            <a:t> </a:t>
+          </a:r>
+          <a:r>
+            <a:rPr lang="en-US" dirty="0" err="1" smtClean="0">
+              <a:solidFill>
+                <a:srgbClr val="002060"/>
+              </a:solidFill>
+              <a:latin typeface="Tahoma" panose="020B0604030504040204" pitchFamily="34" charset="0"/>
+              <a:ea typeface="Tahoma" panose="020B0604030504040204" pitchFamily="34" charset="0"/>
+              <a:cs typeface="Tahoma" panose="020B0604030504040204" pitchFamily="34" charset="0"/>
+            </a:rPr>
+            <a:t>hàng</a:t>
+          </a:r>
+          <a:r>
+            <a:rPr lang="en-US" dirty="0" smtClean="0">
+              <a:solidFill>
+                <a:srgbClr val="002060"/>
+              </a:solidFill>
+              <a:latin typeface="Tahoma" panose="020B0604030504040204" pitchFamily="34" charset="0"/>
+              <a:ea typeface="Tahoma" panose="020B0604030504040204" pitchFamily="34" charset="0"/>
+              <a:cs typeface="Tahoma" panose="020B0604030504040204" pitchFamily="34" charset="0"/>
+            </a:rPr>
+            <a:t>.</a:t>
           </a:r>
           <a:endParaRPr lang="vi-VN" b="1" dirty="0">
             <a:solidFill>
@@ -4302,7 +4324,29 @@
               <a:ea typeface="Tahoma" panose="020B0604030504040204" pitchFamily="34" charset="0"/>
               <a:cs typeface="Tahoma" panose="020B0604030504040204" pitchFamily="34" charset="0"/>
             </a:rPr>
-            <a:t> hang.</a:t>
+            <a:t> </a:t>
+          </a:r>
+          <a:r>
+            <a:rPr lang="en-US" sz="2300" kern="1200" dirty="0" err="1" smtClean="0">
+              <a:solidFill>
+                <a:srgbClr val="002060"/>
+              </a:solidFill>
+              <a:latin typeface="Tahoma" panose="020B0604030504040204" pitchFamily="34" charset="0"/>
+              <a:ea typeface="Tahoma" panose="020B0604030504040204" pitchFamily="34" charset="0"/>
+              <a:cs typeface="Tahoma" panose="020B0604030504040204" pitchFamily="34" charset="0"/>
+            </a:rPr>
+            <a:t>hàng</a:t>
+          </a:r>
+          <a:r>
+            <a:rPr lang="en-US" sz="2300" kern="1200" dirty="0" smtClean="0">
+              <a:solidFill>
+                <a:srgbClr val="002060"/>
+              </a:solidFill>
+              <a:latin typeface="Tahoma" panose="020B0604030504040204" pitchFamily="34" charset="0"/>
+              <a:ea typeface="Tahoma" panose="020B0604030504040204" pitchFamily="34" charset="0"/>
+              <a:cs typeface="Tahoma" panose="020B0604030504040204" pitchFamily="34" charset="0"/>
+            </a:rPr>
+            <a:t>.</a:t>
           </a:r>
           <a:endParaRPr lang="vi-VN" sz="2300" b="1" kern="1200" dirty="0">
             <a:solidFill>
@@ -6762,7 +6806,7 @@
           <a:p>
             <a:fld id="{20A605B6-6025-473A-B0B1-F6F108C5D9E3}" type="datetimeFigureOut">
               <a:rPr lang="en-US" smtClean="0"/>
-              <a:t>5/10/2019</a:t>
+              <a:t>5/11/2019</a:t>
             </a:fld>
             <a:endParaRPr lang="en-US"/>
           </a:p>
@@ -7211,7 +7255,7 @@
           <a:p>
             <a:fld id="{E01A347D-FE15-4445-91C9-4112D5C85F78}" type="datetimeFigureOut">
               <a:rPr lang="en-US" smtClean="0"/>
-              <a:t>5/10/2019</a:t>
+              <a:t>5/11/2019</a:t>
             </a:fld>
             <a:endParaRPr lang="en-US"/>
           </a:p>
@@ -7393,7 +7437,7 @@
           <a:p>
             <a:fld id="{E01A347D-FE15-4445-91C9-4112D5C85F78}" type="datetimeFigureOut">
               <a:rPr lang="en-US" smtClean="0"/>
-              <a:t>5/10/2019</a:t>
+              <a:t>5/11/2019</a:t>
             </a:fld>
             <a:endParaRPr lang="en-US"/>
           </a:p>
@@ -7585,7 +7629,7 @@
           <a:p>
             <a:fld id="{E01A347D-FE15-4445-91C9-4112D5C85F78}" type="datetimeFigureOut">
               <a:rPr lang="en-US" smtClean="0"/>
-              <a:t>5/10/2019</a:t>
+              <a:t>5/11/2019</a:t>
             </a:fld>
             <a:endParaRPr lang="en-US"/>
           </a:p>
@@ -7767,7 +7811,7 @@
           <a:p>
             <a:fld id="{E01A347D-FE15-4445-91C9-4112D5C85F78}" type="datetimeFigureOut">
               <a:rPr lang="en-US" smtClean="0"/>
-              <a:t>5/10/2019</a:t>
+              <a:t>5/11/2019</a:t>
             </a:fld>
             <a:endParaRPr lang="en-US"/>
           </a:p>
@@ -8025,7 +8069,7 @@
           <a:p>
             <a:fld id="{E01A347D-FE15-4445-91C9-4112D5C85F78}" type="datetimeFigureOut">
               <a:rPr lang="en-US" smtClean="0"/>
-              <a:t>5/10/2019</a:t>
+              <a:t>5/11/2019</a:t>
             </a:fld>
             <a:endParaRPr lang="en-US"/>
           </a:p>
@@ -8325,7 +8369,7 @@
           <a:p>
             <a:fld id="{E01A347D-FE15-4445-91C9-4112D5C85F78}" type="datetimeFigureOut">
               <a:rPr lang="en-US" smtClean="0"/>
-              <a:t>5/10/2019</a:t>
+              <a:t>5/11/2019</a:t>
             </a:fld>
             <a:endParaRPr lang="en-US"/>
           </a:p>
@@ -8759,7 +8803,7 @@
           <a:p>
             <a:fld id="{E01A347D-FE15-4445-91C9-4112D5C85F78}" type="datetimeFigureOut">
               <a:rPr lang="en-US" smtClean="0"/>
-              <a:t>5/10/2019</a:t>
+              <a:t>5/11/2019</a:t>
             </a:fld>
             <a:endParaRPr lang="en-US"/>
           </a:p>
@@ -8889,7 +8933,7 @@
           <a:p>
             <a:fld id="{E01A347D-FE15-4445-91C9-4112D5C85F78}" type="datetimeFigureOut">
               <a:rPr lang="en-US" smtClean="0"/>
-              <a:t>5/10/2019</a:t>
+              <a:t>5/11/2019</a:t>
             </a:fld>
             <a:endParaRPr lang="en-US"/>
           </a:p>
@@ -8996,7 +9040,7 @@
           <a:p>
             <a:fld id="{E01A347D-FE15-4445-91C9-4112D5C85F78}" type="datetimeFigureOut">
               <a:rPr lang="en-US" smtClean="0"/>
-              <a:t>5/10/2019</a:t>
+              <a:t>5/11/2019</a:t>
             </a:fld>
             <a:endParaRPr lang="en-US"/>
           </a:p>
@@ -9285,7 +9329,7 @@
           <a:p>
             <a:fld id="{E01A347D-FE15-4445-91C9-4112D5C85F78}" type="datetimeFigureOut">
               <a:rPr lang="en-US" smtClean="0"/>
-              <a:t>5/10/2019</a:t>
+              <a:t>5/11/2019</a:t>
             </a:fld>
             <a:endParaRPr lang="en-US"/>
           </a:p>
@@ -9554,7 +9598,7 @@
           <a:p>
             <a:fld id="{E01A347D-FE15-4445-91C9-4112D5C85F78}" type="datetimeFigureOut">
               <a:rPr lang="en-US" smtClean="0"/>
-              <a:t>5/10/2019</a:t>
+              <a:t>5/11/2019</a:t>
             </a:fld>
             <a:endParaRPr lang="en-US"/>
           </a:p>
@@ -9788,7 +9832,7 @@
           <a:p>
             <a:fld id="{E01A347D-FE15-4445-91C9-4112D5C85F78}" type="datetimeFigureOut">
               <a:rPr lang="en-US" smtClean="0"/>
-              <a:t>5/10/2019</a:t>
+              <a:t>5/11/2019</a:t>
             </a:fld>
             <a:endParaRPr lang="en-US"/>
           </a:p>
@@ -11219,6 +11263,199 @@
               <a:buFont typeface="Wingdings" panose="05000000000000000000" pitchFamily="2" charset="2"/>
               <a:buChar char="§"/>
             </a:pPr>
+            <a:r>
+              <a:rPr lang="en-US" sz="2400" dirty="0" err="1" smtClean="0">
+                <a:solidFill>
+                  <a:srgbClr val="002060"/>
+                </a:solidFill>
+                <a:latin typeface="Tahoma"/>
+                <a:ea typeface="Tahoma"/>
+                <a:cs typeface="Tahoma"/>
+              </a:rPr>
+              <a:t>Chưa</a:t>
+            </a:r>
+            <a:r>
+              <a:rPr lang="en-US" sz="2400" dirty="0" smtClean="0">
+                <a:solidFill>
+                  <a:srgbClr val="002060"/>
+                </a:solidFill>
+                <a:latin typeface="Tahoma"/>
+                <a:ea typeface="Tahoma"/>
+                <a:cs typeface="Tahoma"/>
+              </a:rPr>
+              <a:t> </a:t>
+            </a:r>
+            <a:r>
+              <a:rPr lang="en-US" sz="2400" dirty="0" err="1" smtClean="0">
+                <a:solidFill>
+                  <a:srgbClr val="002060"/>
+                </a:solidFill>
+                <a:latin typeface="Tahoma"/>
+                <a:ea typeface="Tahoma"/>
+                <a:cs typeface="Tahoma"/>
+              </a:rPr>
+              <a:t>chuẩn</a:t>
+            </a:r>
+            <a:r>
+              <a:rPr lang="en-US" sz="2400" dirty="0" smtClean="0">
+                <a:solidFill>
+                  <a:srgbClr val="002060"/>
+                </a:solidFill>
+                <a:latin typeface="Tahoma"/>
+                <a:ea typeface="Tahoma"/>
+                <a:cs typeface="Tahoma"/>
+              </a:rPr>
+              <a:t> </a:t>
+            </a:r>
+            <a:r>
+              <a:rPr lang="en-US" sz="2400" dirty="0" err="1" smtClean="0">
+                <a:solidFill>
+                  <a:srgbClr val="002060"/>
+                </a:solidFill>
+                <a:latin typeface="Tahoma"/>
+                <a:ea typeface="Tahoma"/>
+                <a:cs typeface="Tahoma"/>
+              </a:rPr>
+              <a:t>hóa</a:t>
+            </a:r>
+            <a:r>
+              <a:rPr lang="en-US" sz="2400" dirty="0" smtClean="0">
+                <a:solidFill>
+                  <a:srgbClr val="002060"/>
+                </a:solidFill>
+                <a:latin typeface="Tahoma"/>
+                <a:ea typeface="Tahoma"/>
+                <a:cs typeface="Tahoma"/>
+              </a:rPr>
+              <a:t> CSDL, </a:t>
+            </a:r>
+            <a:r>
+              <a:rPr lang="en-US" sz="2400" dirty="0" err="1" smtClean="0">
+                <a:solidFill>
+                  <a:srgbClr val="002060"/>
+                </a:solidFill>
+                <a:latin typeface="Tahoma"/>
+                <a:ea typeface="Tahoma"/>
+                <a:cs typeface="Tahoma"/>
+              </a:rPr>
+              <a:t>dư</a:t>
+            </a:r>
+            <a:r>
+              <a:rPr lang="en-US" sz="2400" dirty="0" smtClean="0">
+                <a:solidFill>
+                  <a:srgbClr val="002060"/>
+                </a:solidFill>
+                <a:latin typeface="Tahoma"/>
+                <a:ea typeface="Tahoma"/>
+                <a:cs typeface="Tahoma"/>
+              </a:rPr>
+              <a:t> </a:t>
+            </a:r>
+            <a:r>
+              <a:rPr lang="en-US" sz="2400" dirty="0" err="1">
+                <a:solidFill>
+                  <a:srgbClr val="002060"/>
+                </a:solidFill>
+                <a:latin typeface="Tahoma"/>
+                <a:ea typeface="Tahoma"/>
+                <a:cs typeface="Tahoma"/>
+              </a:rPr>
+              <a:t>thừa</a:t>
+            </a:r>
+            <a:r>
+              <a:rPr lang="en-US" sz="2400" dirty="0">
+                <a:solidFill>
+                  <a:srgbClr val="002060"/>
+                </a:solidFill>
+                <a:latin typeface="Tahoma"/>
+                <a:ea typeface="Tahoma"/>
+                <a:cs typeface="Tahoma"/>
+              </a:rPr>
+              <a:t> </a:t>
+            </a:r>
+            <a:r>
+              <a:rPr lang="en-US" sz="2400" dirty="0" err="1">
+                <a:solidFill>
+                  <a:srgbClr val="002060"/>
+                </a:solidFill>
+                <a:latin typeface="Tahoma"/>
+                <a:ea typeface="Tahoma"/>
+                <a:cs typeface="Tahoma"/>
+              </a:rPr>
+              <a:t>về</a:t>
+            </a:r>
+            <a:r>
+              <a:rPr lang="en-US" sz="2400" dirty="0">
+                <a:solidFill>
+                  <a:srgbClr val="002060"/>
+                </a:solidFill>
+                <a:latin typeface="Tahoma"/>
+                <a:ea typeface="Tahoma"/>
+                <a:cs typeface="Tahoma"/>
+              </a:rPr>
+              <a:t> </a:t>
+            </a:r>
+            <a:r>
+              <a:rPr lang="en-US" sz="2400" dirty="0" err="1">
+                <a:solidFill>
+                  <a:srgbClr val="002060"/>
+                </a:solidFill>
+                <a:latin typeface="Tahoma"/>
+                <a:ea typeface="Tahoma"/>
+                <a:cs typeface="Tahoma"/>
+              </a:rPr>
+              <a:t>dữ</a:t>
+            </a:r>
+            <a:r>
+              <a:rPr lang="en-US" sz="2400" dirty="0">
+                <a:solidFill>
+                  <a:srgbClr val="002060"/>
+                </a:solidFill>
+                <a:latin typeface="Tahoma"/>
+                <a:ea typeface="Tahoma"/>
+                <a:cs typeface="Tahoma"/>
+              </a:rPr>
+              <a:t> </a:t>
+            </a:r>
+            <a:r>
+              <a:rPr lang="en-US" sz="2400" dirty="0" err="1" smtClean="0">
+                <a:solidFill>
+                  <a:srgbClr val="002060"/>
+                </a:solidFill>
+                <a:latin typeface="Tahoma"/>
+                <a:ea typeface="Tahoma"/>
+                <a:cs typeface="Tahoma"/>
+              </a:rPr>
+              <a:t>liệ</a:t>
+            </a:r>
+            <a:r>
+              <a:rPr lang="en-US" sz="2400" dirty="0" err="1">
+                <a:solidFill>
+                  <a:srgbClr val="002060"/>
+                </a:solidFill>
+                <a:latin typeface="Tahoma"/>
+                <a:ea typeface="Tahoma"/>
+                <a:cs typeface="Tahoma"/>
+              </a:rPr>
+              <a:t>u</a:t>
+            </a:r>
+            <a:endParaRPr lang="en-US" sz="2400" dirty="0" smtClean="0">
+              <a:solidFill>
+                <a:srgbClr val="002060"/>
+              </a:solidFill>
+              <a:latin typeface="Tahoma"/>
+              <a:ea typeface="Tahoma"/>
+              <a:cs typeface="Tahoma"/>
+            </a:endParaRPr>
+          </a:p>
+          <a:p>
+            <a:pPr marL="342900" indent="-342900">
+              <a:lnSpc>
+                <a:spcPct val="150000"/>
+              </a:lnSpc>
+              <a:buFont typeface="Wingdings" panose="05000000000000000000" pitchFamily="2" charset="2"/>
+              <a:buChar char="§"/>
+            </a:pPr>
             <a:endParaRPr lang="en-US" sz="2400" dirty="0">
               <a:solidFill>
                 <a:srgbClr val="002060"/>
@@ -14598,7 +14835,7 @@
                 <a:ea typeface="Tahoma" pitchFamily="34" charset="0"/>
                 <a:cs typeface="Tahoma" pitchFamily="34" charset="0"/>
               </a:rPr>
-              <a:t>IV</a:t>
+              <a:t>III</a:t>
             </a:r>
             <a:endParaRPr lang="en-US" sz="4000" b="1" dirty="0">
               <a:solidFill>
@@ -14767,7 +15004,7 @@
                 <a:ea typeface="Tahoma" pitchFamily="34" charset="0"/>
                 <a:cs typeface="Tahoma" pitchFamily="34" charset="0"/>
               </a:rPr>
-              <a:t>V</a:t>
+              <a:t>IV</a:t>
             </a:r>
             <a:endParaRPr lang="en-US" sz="4000" b="1" dirty="0">
               <a:solidFill>
@@ -14947,7 +15184,7 @@
                 <a:ea typeface="Tahoma" pitchFamily="34" charset="0"/>
                 <a:cs typeface="Tahoma" pitchFamily="34" charset="0"/>
               </a:rPr>
-              <a:t>VI</a:t>
+              <a:t>V</a:t>
             </a:r>
             <a:endParaRPr lang="en-US" sz="4000" b="1" dirty="0">
               <a:solidFill>
@@ -16202,7 +16439,7 @@
         <p:spPr>
           <a:xfrm>
             <a:off x="2961567" y="2009174"/>
-            <a:ext cx="2415653" cy="1640267"/>
+            <a:ext cx="2565779" cy="1640267"/>
           </a:xfrm>
           <a:prstGeom prst="roundRect">
             <a:avLst/>
@@ -17411,7 +17648,7 @@
             <p:ph idx="1"/>
             <p:extLst>
               <p:ext uri="{D42A27DB-BD31-4B8C-83A1-F6EECF244321}">
-                <p14:modId xmlns:p14="http://schemas.microsoft.com/office/powerpoint/2010/main" val="3099090608"/>
+                <p14:modId xmlns:p14="http://schemas.microsoft.com/office/powerpoint/2010/main" val="784713018"/>
               </p:ext>
             </p:extLst>
           </p:nvPr>
@@ -17497,29 +17734,7 @@
                 <a:ea typeface="Tahoma" pitchFamily="34" charset="0"/>
                 <a:cs typeface="Tahoma" pitchFamily="34" charset="0"/>
               </a:rPr>
-              <a:t>II. MỤC </a:t>
-            </a:r>
-            <a:r>
-              <a:rPr lang="en-US" sz="3500" b="1" dirty="0" smtClean="0">
-                <a:solidFill>
-                  <a:srgbClr val="FFFFFF"/>
-                </a:solidFill>
-                <a:latin typeface="Tahoma" pitchFamily="34" charset="0"/>
-                <a:ea typeface="Tahoma" pitchFamily="34" charset="0"/>
-                <a:cs typeface="Tahoma" pitchFamily="34" charset="0"/>
-              </a:rPr>
-              <a:t>ĐÍCH CỦA </a:t>
-            </a:r>
-            <a:r>
-              <a:rPr lang="en-US" sz="3500" b="1" dirty="0" smtClean="0">
-                <a:solidFill>
-                  <a:srgbClr val="FFFFFF"/>
-                </a:solidFill>
-                <a:latin typeface="Tahoma" pitchFamily="34" charset="0"/>
-                <a:ea typeface="Tahoma" pitchFamily="34" charset="0"/>
-                <a:cs typeface="Tahoma" pitchFamily="34" charset="0"/>
-              </a:rPr>
-              <a:t>ĐỀ TÀI</a:t>
+              <a:t>II. MỤC ĐÍCH CỦA ĐỀ TÀI</a:t>
             </a:r>
             <a:endParaRPr lang="en-US" sz="3500" dirty="0">
               <a:solidFill>
@@ -18582,7 +18797,18 @@
                 <a:ea typeface="Tahoma" panose="020B0604030504040204" pitchFamily="34" charset="0"/>
                 <a:cs typeface="Tahoma" panose="020B0604030504040204" pitchFamily="34" charset="0"/>
               </a:rPr>
-              <a:t> online</a:t>
+              <a:t> </a:t>
+            </a:r>
+            <a:r>
+              <a:rPr lang="en-US" sz="2400" dirty="0" smtClean="0">
+                <a:solidFill>
+                  <a:srgbClr val="002060"/>
+                </a:solidFill>
+                <a:latin typeface="Tahoma" panose="020B0604030504040204" pitchFamily="34" charset="0"/>
+                <a:ea typeface="Tahoma" panose="020B0604030504040204" pitchFamily="34" charset="0"/>
+                <a:cs typeface="Tahoma" panose="020B0604030504040204" pitchFamily="34" charset="0"/>
+              </a:rPr>
+              <a:t>online.</a:t>
             </a:r>
             <a:endParaRPr lang="en-US" sz="2400" dirty="0">
               <a:solidFill>
@@ -18755,7 +18981,7 @@
               <a:t> </a:t>
             </a:r>
             <a:r>
-              <a:rPr lang="en-US" sz="2400" dirty="0" err="1">
+              <a:rPr lang="en-US" sz="2400" dirty="0" err="1" smtClean="0">
                 <a:solidFill>
                   <a:srgbClr val="002060"/>
                 </a:solidFill>
@@ -18764,6 +18990,17 @@
                 <a:cs typeface="Tahoma" panose="020B0604030504040204" pitchFamily="34" charset="0"/>
               </a:rPr>
               <a:t>phẩm</a:t>
+            </a:r>
+            <a:r>
+              <a:rPr lang="en-US" sz="2400" dirty="0" smtClean="0">
+                <a:solidFill>
+                  <a:srgbClr val="002060"/>
+                </a:solidFill>
+                <a:latin typeface="Tahoma" panose="020B0604030504040204" pitchFamily="34" charset="0"/>
+                <a:ea typeface="Tahoma" panose="020B0604030504040204" pitchFamily="34" charset="0"/>
+                <a:cs typeface="Tahoma" panose="020B0604030504040204" pitchFamily="34" charset="0"/>
+              </a:rPr>
+              <a:t>.</a:t>
             </a:r>
             <a:endParaRPr lang="en-US" sz="2400" dirty="0">
               <a:solidFill>
@@ -18892,7 +19129,7 @@
               <a:t> </a:t>
             </a:r>
             <a:r>
-              <a:rPr lang="en-US" sz="2400" dirty="0" err="1">
+              <a:rPr lang="en-US" sz="2400" dirty="0" err="1" smtClean="0">
                 <a:solidFill>
                   <a:srgbClr val="002060"/>
                 </a:solidFill>
@@ -18901,6 +19138,17 @@
                 <a:cs typeface="Tahoma" panose="020B0604030504040204" pitchFamily="34" charset="0"/>
               </a:rPr>
               <a:t>hàng</a:t>
+            </a:r>
+            <a:r>
+              <a:rPr lang="en-US" sz="2400" dirty="0" smtClean="0">
+                <a:solidFill>
+                  <a:srgbClr val="002060"/>
+                </a:solidFill>
+                <a:latin typeface="Tahoma" panose="020B0604030504040204" pitchFamily="34" charset="0"/>
+                <a:ea typeface="Tahoma" panose="020B0604030504040204" pitchFamily="34" charset="0"/>
+                <a:cs typeface="Tahoma" panose="020B0604030504040204" pitchFamily="34" charset="0"/>
+              </a:rPr>
+              <a:t>.</a:t>
             </a:r>
             <a:endParaRPr lang="en-US" sz="2400" dirty="0">
               <a:solidFill>
@@ -19139,7 +19387,7 @@
               <a:t> </a:t>
             </a:r>
             <a:r>
-              <a:rPr lang="en-US" sz="2400" dirty="0" err="1">
+              <a:rPr lang="en-US" sz="2400" dirty="0" err="1" smtClean="0">
                 <a:solidFill>
                   <a:srgbClr val="002060"/>
                 </a:solidFill>
@@ -19148,6 +19396,17 @@
                 <a:cs typeface="Tahoma" panose="020B0604030504040204" pitchFamily="34" charset="0"/>
               </a:rPr>
               <a:t>hệ</a:t>
+            </a:r>
+            <a:r>
+              <a:rPr lang="en-US" sz="2400" dirty="0" smtClean="0">
+                <a:solidFill>
+                  <a:srgbClr val="002060"/>
+                </a:solidFill>
+                <a:latin typeface="Tahoma" panose="020B0604030504040204" pitchFamily="34" charset="0"/>
+                <a:ea typeface="Tahoma" panose="020B0604030504040204" pitchFamily="34" charset="0"/>
+                <a:cs typeface="Tahoma" panose="020B0604030504040204" pitchFamily="34" charset="0"/>
+              </a:rPr>
+              <a:t>.</a:t>
             </a:r>
             <a:endParaRPr lang="en-US" sz="2400" dirty="0">
               <a:solidFill>
@@ -19493,6 +19752,17 @@
               </a:rPr>
               <a:t>hàng</a:t>
             </a:r>
+            <a:r>
+              <a:rPr lang="en-US" sz="2400" dirty="0" smtClean="0">
+                <a:solidFill>
+                  <a:srgbClr val="002060"/>
+                </a:solidFill>
+                <a:latin typeface="Tahoma" panose="020B0604030504040204" pitchFamily="34" charset="0"/>
+                <a:ea typeface="Tahoma" panose="020B0604030504040204" pitchFamily="34" charset="0"/>
+                <a:cs typeface="Tahoma" panose="020B0604030504040204" pitchFamily="34" charset="0"/>
+              </a:rPr>
+              <a:t>.</a:t>
+            </a:r>
             <a:endParaRPr lang="en-US" sz="2400" dirty="0">
               <a:solidFill>
                 <a:srgbClr val="002060"/>
@@ -19620,7 +19890,7 @@
               <a:t> </a:t>
             </a:r>
             <a:r>
-              <a:rPr lang="en-US" sz="2400" dirty="0" err="1">
+              <a:rPr lang="en-US" sz="2400" dirty="0" err="1" smtClean="0">
                 <a:solidFill>
                   <a:srgbClr val="002060"/>
                 </a:solidFill>
@@ -19629,6 +19899,17 @@
                 <a:cs typeface="Tahoma" panose="020B0604030504040204" pitchFamily="34" charset="0"/>
               </a:rPr>
               <a:t>phẩm</a:t>
+            </a:r>
+            <a:r>
+              <a:rPr lang="en-US" sz="2400" dirty="0" smtClean="0">
+                <a:solidFill>
+                  <a:srgbClr val="002060"/>
+                </a:solidFill>
+                <a:latin typeface="Tahoma" panose="020B0604030504040204" pitchFamily="34" charset="0"/>
+                <a:ea typeface="Tahoma" panose="020B0604030504040204" pitchFamily="34" charset="0"/>
+                <a:cs typeface="Tahoma" panose="020B0604030504040204" pitchFamily="34" charset="0"/>
+              </a:rPr>
+              <a:t>.</a:t>
             </a:r>
             <a:endParaRPr lang="en-US" sz="2400" dirty="0">
               <a:solidFill>
@@ -19767,6 +20048,17 @@
               </a:rPr>
               <a:t>hàng</a:t>
             </a:r>
+            <a:r>
+              <a:rPr lang="en-US" sz="2400" dirty="0" smtClean="0">
+                <a:solidFill>
+                  <a:srgbClr val="002060"/>
+                </a:solidFill>
+                <a:latin typeface="Tahoma" panose="020B0604030504040204" pitchFamily="34" charset="0"/>
+                <a:ea typeface="Tahoma" panose="020B0604030504040204" pitchFamily="34" charset="0"/>
+                <a:cs typeface="Tahoma" panose="020B0604030504040204" pitchFamily="34" charset="0"/>
+              </a:rPr>
+              <a:t>.</a:t>
+            </a:r>
             <a:endParaRPr lang="en-US" sz="2400" dirty="0">
               <a:solidFill>
                 <a:srgbClr val="002060"/>
@@ -19993,7 +20285,7 @@
               <a:t> </a:t>
             </a:r>
             <a:r>
-              <a:rPr lang="en-US" sz="2400" dirty="0" err="1">
+              <a:rPr lang="en-US" sz="2400" dirty="0" err="1" smtClean="0">
                 <a:solidFill>
                   <a:srgbClr val="002060"/>
                 </a:solidFill>
@@ -20002,6 +20294,17 @@
                 <a:cs typeface="Tahoma" panose="020B0604030504040204" pitchFamily="34" charset="0"/>
               </a:rPr>
               <a:t>hàng</a:t>
+            </a:r>
+            <a:r>
+              <a:rPr lang="en-US" sz="2400" dirty="0" smtClean="0">
+                <a:solidFill>
+                  <a:srgbClr val="002060"/>
+                </a:solidFill>
+                <a:latin typeface="Tahoma" panose="020B0604030504040204" pitchFamily="34" charset="0"/>
+                <a:ea typeface="Tahoma" panose="020B0604030504040204" pitchFamily="34" charset="0"/>
+                <a:cs typeface="Tahoma" panose="020B0604030504040204" pitchFamily="34" charset="0"/>
+              </a:rPr>
+              <a:t>.</a:t>
             </a:r>
             <a:endParaRPr lang="vi-VN" sz="2400" dirty="0">
               <a:solidFill>
@@ -20520,7 +20823,7 @@
         <p:spPr>
           <a:xfrm>
             <a:off x="1082202" y="1646856"/>
-            <a:ext cx="7068531" cy="901964"/>
+            <a:ext cx="7068531" cy="780255"/>
           </a:xfrm>
           <a:prstGeom prst="rect">
             <a:avLst/>
@@ -20799,8 +21102,8 @@
         </p:nvSpPr>
         <p:spPr>
           <a:xfrm>
-            <a:off x="1081451" y="2795725"/>
-            <a:ext cx="7069281" cy="807284"/>
+            <a:off x="1081451" y="2667000"/>
+            <a:ext cx="7069281" cy="936009"/>
           </a:xfrm>
           <a:prstGeom prst="rect">
             <a:avLst/>
@@ -21292,7 +21595,7 @@
         <p:spPr>
           <a:xfrm>
             <a:off x="1081452" y="3845561"/>
-            <a:ext cx="7069280" cy="766271"/>
+            <a:ext cx="7069280" cy="881788"/>
           </a:xfrm>
           <a:prstGeom prst="rect">
             <a:avLst/>
@@ -21549,7 +21852,7 @@
         </p:nvSpPr>
         <p:spPr>
           <a:xfrm>
-            <a:off x="1081452" y="4851721"/>
+            <a:off x="1081452" y="4953322"/>
             <a:ext cx="7069279" cy="796795"/>
           </a:xfrm>
           <a:prstGeom prst="rect">
@@ -24391,7 +24694,7 @@
               <a:t> website </a:t>
             </a:r>
             <a:r>
-              <a:rPr lang="en-US" sz="2400" dirty="0" err="1">
+              <a:rPr lang="en-US" sz="2400" dirty="0" err="1" smtClean="0">
                 <a:solidFill>
                   <a:srgbClr val="002060"/>
                 </a:solidFill>
@@ -24399,10 +24702,10 @@
                 <a:ea typeface="Tahoma"/>
                 <a:cs typeface="Tahoma"/>
               </a:rPr>
-              <a:t>bán</a:t>
-            </a:r>
-            <a:r>
-              <a:rPr lang="en-US" sz="2400" dirty="0">
+              <a:t>thương</a:t>
+            </a:r>
+            <a:r>
+              <a:rPr lang="en-US" sz="2400" dirty="0" smtClean="0">
                 <a:solidFill>
                   <a:srgbClr val="002060"/>
                 </a:solidFill>
@@ -24413,7 +24716,7 @@
               <a:t> </a:t>
             </a:r>
             <a:r>
-              <a:rPr lang="en-US" sz="2400" dirty="0" err="1">
+              <a:rPr lang="en-US" sz="2400" dirty="0" err="1" smtClean="0">
                 <a:solidFill>
                   <a:srgbClr val="002060"/>
                 </a:solidFill>
@@ -24421,10 +24724,10 @@
                 <a:ea typeface="Tahoma"/>
                 <a:cs typeface="Tahoma"/>
               </a:rPr>
-              <a:t>hàng</a:t>
-            </a:r>
-            <a:r>
-              <a:rPr lang="en-US" sz="2400" dirty="0">
+              <a:t>mại</a:t>
+            </a:r>
+            <a:r>
+              <a:rPr lang="en-US" sz="2400" dirty="0" smtClean="0">
                 <a:solidFill>
                   <a:srgbClr val="002060"/>
                 </a:solidFill>
@@ -24432,7 +24735,40 @@
                 <a:ea typeface="Tahoma"/>
                 <a:cs typeface="Tahoma"/>
               </a:rPr>
-              <a:t> online</a:t>
+              <a:t> </a:t>
+            </a:r>
+            <a:r>
+              <a:rPr lang="en-US" sz="2400" dirty="0" err="1" smtClean="0">
+                <a:solidFill>
+                  <a:srgbClr val="002060"/>
+                </a:solidFill>
+                <a:latin typeface="Tahoma"/>
+                <a:ea typeface="Tahoma"/>
+                <a:cs typeface="Tahoma"/>
+              </a:rPr>
+              <a:t>điện</a:t>
+            </a:r>
+            <a:r>
+              <a:rPr lang="en-US" sz="2400" dirty="0" smtClean="0">
+                <a:solidFill>
+                  <a:srgbClr val="002060"/>
+                </a:solidFill>
+                <a:latin typeface="Tahoma"/>
+                <a:ea typeface="Tahoma"/>
+                <a:cs typeface="Tahoma"/>
+              </a:rPr>
+              <a:t> </a:t>
+            </a:r>
+            <a:r>
+              <a:rPr lang="en-US" sz="2400" dirty="0" err="1" smtClean="0">
+                <a:solidFill>
+                  <a:srgbClr val="002060"/>
+                </a:solidFill>
+                <a:latin typeface="Tahoma"/>
+                <a:ea typeface="Tahoma"/>
+                <a:cs typeface="Tahoma"/>
+              </a:rPr>
+              <a:t>tử</a:t>
             </a:r>
             <a:r>
               <a:rPr lang="en-US" sz="2400" dirty="0" smtClean="0">

</xml_diff>

<commit_message>
Fix some bug linh tinh. Chiều đi bảo vệ tốt nhé. Tự tin lên nào
</commit_message>
<xml_diff>
--- a/database/TranTuanNgoc_DoAn.pptx
+++ b/database/TranTuanNgoc_DoAn.pptx
@@ -6806,7 +6806,7 @@
           <a:p>
             <a:fld id="{20A605B6-6025-473A-B0B1-F6F108C5D9E3}" type="datetimeFigureOut">
               <a:rPr lang="en-US" smtClean="0"/>
-              <a:t>5/11/2019</a:t>
+              <a:t>5/12/2019</a:t>
             </a:fld>
             <a:endParaRPr lang="en-US"/>
           </a:p>
@@ -7255,7 +7255,7 @@
           <a:p>
             <a:fld id="{E01A347D-FE15-4445-91C9-4112D5C85F78}" type="datetimeFigureOut">
               <a:rPr lang="en-US" smtClean="0"/>
-              <a:t>5/11/2019</a:t>
+              <a:t>5/12/2019</a:t>
             </a:fld>
             <a:endParaRPr lang="en-US"/>
           </a:p>
@@ -7437,7 +7437,7 @@
           <a:p>
             <a:fld id="{E01A347D-FE15-4445-91C9-4112D5C85F78}" type="datetimeFigureOut">
               <a:rPr lang="en-US" smtClean="0"/>
-              <a:t>5/11/2019</a:t>
+              <a:t>5/12/2019</a:t>
             </a:fld>
             <a:endParaRPr lang="en-US"/>
           </a:p>
@@ -7629,7 +7629,7 @@
           <a:p>
             <a:fld id="{E01A347D-FE15-4445-91C9-4112D5C85F78}" type="datetimeFigureOut">
               <a:rPr lang="en-US" smtClean="0"/>
-              <a:t>5/11/2019</a:t>
+              <a:t>5/12/2019</a:t>
             </a:fld>
             <a:endParaRPr lang="en-US"/>
           </a:p>
@@ -7811,7 +7811,7 @@
           <a:p>
             <a:fld id="{E01A347D-FE15-4445-91C9-4112D5C85F78}" type="datetimeFigureOut">
               <a:rPr lang="en-US" smtClean="0"/>
-              <a:t>5/11/2019</a:t>
+              <a:t>5/12/2019</a:t>
             </a:fld>
             <a:endParaRPr lang="en-US"/>
           </a:p>
@@ -8069,7 +8069,7 @@
           <a:p>
             <a:fld id="{E01A347D-FE15-4445-91C9-4112D5C85F78}" type="datetimeFigureOut">
               <a:rPr lang="en-US" smtClean="0"/>
-              <a:t>5/11/2019</a:t>
+              <a:t>5/12/2019</a:t>
             </a:fld>
             <a:endParaRPr lang="en-US"/>
           </a:p>
@@ -8369,7 +8369,7 @@
           <a:p>
             <a:fld id="{E01A347D-FE15-4445-91C9-4112D5C85F78}" type="datetimeFigureOut">
               <a:rPr lang="en-US" smtClean="0"/>
-              <a:t>5/11/2019</a:t>
+              <a:t>5/12/2019</a:t>
             </a:fld>
             <a:endParaRPr lang="en-US"/>
           </a:p>
@@ -8803,7 +8803,7 @@
           <a:p>
             <a:fld id="{E01A347D-FE15-4445-91C9-4112D5C85F78}" type="datetimeFigureOut">
               <a:rPr lang="en-US" smtClean="0"/>
-              <a:t>5/11/2019</a:t>
+              <a:t>5/12/2019</a:t>
             </a:fld>
             <a:endParaRPr lang="en-US"/>
           </a:p>
@@ -8933,7 +8933,7 @@
           <a:p>
             <a:fld id="{E01A347D-FE15-4445-91C9-4112D5C85F78}" type="datetimeFigureOut">
               <a:rPr lang="en-US" smtClean="0"/>
-              <a:t>5/11/2019</a:t>
+              <a:t>5/12/2019</a:t>
             </a:fld>
             <a:endParaRPr lang="en-US"/>
           </a:p>
@@ -9040,7 +9040,7 @@
           <a:p>
             <a:fld id="{E01A347D-FE15-4445-91C9-4112D5C85F78}" type="datetimeFigureOut">
               <a:rPr lang="en-US" smtClean="0"/>
-              <a:t>5/11/2019</a:t>
+              <a:t>5/12/2019</a:t>
             </a:fld>
             <a:endParaRPr lang="en-US"/>
           </a:p>
@@ -9329,7 +9329,7 @@
           <a:p>
             <a:fld id="{E01A347D-FE15-4445-91C9-4112D5C85F78}" type="datetimeFigureOut">
               <a:rPr lang="en-US" smtClean="0"/>
-              <a:t>5/11/2019</a:t>
+              <a:t>5/12/2019</a:t>
             </a:fld>
             <a:endParaRPr lang="en-US"/>
           </a:p>
@@ -9598,7 +9598,7 @@
           <a:p>
             <a:fld id="{E01A347D-FE15-4445-91C9-4112D5C85F78}" type="datetimeFigureOut">
               <a:rPr lang="en-US" smtClean="0"/>
-              <a:t>5/11/2019</a:t>
+              <a:t>5/12/2019</a:t>
             </a:fld>
             <a:endParaRPr lang="en-US"/>
           </a:p>
@@ -9832,7 +9832,7 @@
           <a:p>
             <a:fld id="{E01A347D-FE15-4445-91C9-4112D5C85F78}" type="datetimeFigureOut">
               <a:rPr lang="en-US" smtClean="0"/>
-              <a:t>5/11/2019</a:t>
+              <a:t>5/12/2019</a:t>
             </a:fld>
             <a:endParaRPr lang="en-US"/>
           </a:p>
@@ -18797,18 +18797,7 @@
                 <a:ea typeface="Tahoma" panose="020B0604030504040204" pitchFamily="34" charset="0"/>
                 <a:cs typeface="Tahoma" panose="020B0604030504040204" pitchFamily="34" charset="0"/>
               </a:rPr>
-              <a:t> </a:t>
-            </a:r>
-            <a:r>
-              <a:rPr lang="en-US" sz="2400" dirty="0" smtClean="0">
-                <a:solidFill>
-                  <a:srgbClr val="002060"/>
-                </a:solidFill>
-                <a:latin typeface="Tahoma" panose="020B0604030504040204" pitchFamily="34" charset="0"/>
-                <a:ea typeface="Tahoma" panose="020B0604030504040204" pitchFamily="34" charset="0"/>
-                <a:cs typeface="Tahoma" panose="020B0604030504040204" pitchFamily="34" charset="0"/>
-              </a:rPr>
-              <a:t>online.</a:t>
+              <a:t> online.</a:t>
             </a:r>
             <a:endParaRPr lang="en-US" sz="2400" dirty="0">
               <a:solidFill>
@@ -24781,14 +24770,6 @@
               </a:rPr>
               <a:t>.</a:t>
             </a:r>
-            <a:endParaRPr lang="en-US" sz="2400" dirty="0" smtClean="0">
-              <a:solidFill>
-                <a:srgbClr val="002060"/>
-              </a:solidFill>
-              <a:latin typeface="Tahoma"/>
-              <a:ea typeface="Tahoma"/>
-              <a:cs typeface="Tahoma"/>
-            </a:endParaRPr>
           </a:p>
           <a:p>
             <a:pPr marL="342900" indent="-342900">

</xml_diff>